<commit_message>
added words "strike" and "spare" in bowloing task description
</commit_message>
<xml_diff>
--- a/tdd.pptx
+++ b/tdd.pptx
@@ -2504,13 +2504,6 @@
         </dgm:presLayoutVars>
       </dgm:prSet>
       <dgm:spPr/>
-      <dgm:t>
-        <a:bodyPr/>
-        <a:lstStyle/>
-        <a:p>
-          <a:endParaRPr lang="ru-RU"/>
-        </a:p>
-      </dgm:t>
     </dgm:pt>
     <dgm:pt modelId="{CF6D50B3-578A-4EA0-A5A0-492FA729F6ED}" type="pres">
       <dgm:prSet presAssocID="{B75F6A3A-9A51-4DF3-8A57-9AEB0739425C}" presName="composite" presStyleCnt="0"/>
@@ -2523,13 +2516,6 @@
         </dgm:presLayoutVars>
       </dgm:prSet>
       <dgm:spPr/>
-      <dgm:t>
-        <a:bodyPr/>
-        <a:lstStyle/>
-        <a:p>
-          <a:endParaRPr lang="ru-RU"/>
-        </a:p>
-      </dgm:t>
     </dgm:pt>
     <dgm:pt modelId="{61EB78D8-69FF-471D-8FEB-71388C442F55}" type="pres">
       <dgm:prSet presAssocID="{B75F6A3A-9A51-4DF3-8A57-9AEB0739425C}" presName="rect1" presStyleLbl="alignImgPlace1" presStyleIdx="0" presStyleCnt="1" custScaleX="596594" custScaleY="114980" custLinFactX="-64576" custLinFactNeighborX="-100000" custLinFactNeighborY="-13065"/>
@@ -2551,9 +2537,9 @@
     </dgm:pt>
   </dgm:ptLst>
   <dgm:cxnLst>
-    <dgm:cxn modelId="{017518C9-1619-4B19-AA03-86BA999BA287}" srcId="{EAB81984-5B84-4970-8447-2B456B8C58DF}" destId="{B75F6A3A-9A51-4DF3-8A57-9AEB0739425C}" srcOrd="0" destOrd="0" parTransId="{203596AF-4F49-40BA-B1E1-11BDD34B512E}" sibTransId="{A056157B-3867-49A4-9195-F3A4F3FBBA8E}"/>
     <dgm:cxn modelId="{1CEAA455-5BF4-4666-95B8-390900AB8124}" type="presOf" srcId="{EAB81984-5B84-4970-8447-2B456B8C58DF}" destId="{3A252E36-3D7E-49E5-B812-EE4CACF0D5CF}" srcOrd="0" destOrd="0" presId="urn:microsoft.com/office/officeart/2008/layout/PictureGrid"/>
     <dgm:cxn modelId="{147A14B3-96E8-4139-969B-9DB1BCB4D95E}" type="presOf" srcId="{B75F6A3A-9A51-4DF3-8A57-9AEB0739425C}" destId="{B29ABF60-EC0F-45AD-A90E-9C76D15C2F14}" srcOrd="0" destOrd="0" presId="urn:microsoft.com/office/officeart/2008/layout/PictureGrid"/>
+    <dgm:cxn modelId="{017518C9-1619-4B19-AA03-86BA999BA287}" srcId="{EAB81984-5B84-4970-8447-2B456B8C58DF}" destId="{B75F6A3A-9A51-4DF3-8A57-9AEB0739425C}" srcOrd="0" destOrd="0" parTransId="{203596AF-4F49-40BA-B1E1-11BDD34B512E}" sibTransId="{A056157B-3867-49A4-9195-F3A4F3FBBA8E}"/>
     <dgm:cxn modelId="{D3458AFA-605E-43EE-8C8A-0E0C1E3CD931}" type="presParOf" srcId="{3A252E36-3D7E-49E5-B812-EE4CACF0D5CF}" destId="{CF6D50B3-578A-4EA0-A5A0-492FA729F6ED}" srcOrd="0" destOrd="0" presId="urn:microsoft.com/office/officeart/2008/layout/PictureGrid"/>
     <dgm:cxn modelId="{9835F3F3-3E30-4AC4-AD89-BC095FA9A878}" type="presParOf" srcId="{CF6D50B3-578A-4EA0-A5A0-492FA729F6ED}" destId="{B29ABF60-EC0F-45AD-A90E-9C76D15C2F14}" srcOrd="0" destOrd="0" presId="urn:microsoft.com/office/officeart/2008/layout/PictureGrid"/>
     <dgm:cxn modelId="{70FA379F-7827-49B9-806E-1FD72CAE8F89}" type="presParOf" srcId="{CF6D50B3-578A-4EA0-A5A0-492FA729F6ED}" destId="{61EB78D8-69FF-471D-8FEB-71388C442F55}" srcOrd="1" destOrd="0" presId="urn:microsoft.com/office/officeart/2008/layout/PictureGrid"/>
@@ -2625,13 +2611,6 @@
         </dgm:presLayoutVars>
       </dgm:prSet>
       <dgm:spPr/>
-      <dgm:t>
-        <a:bodyPr/>
-        <a:lstStyle/>
-        <a:p>
-          <a:endParaRPr lang="ru-RU"/>
-        </a:p>
-      </dgm:t>
     </dgm:pt>
     <dgm:pt modelId="{CF6D50B3-578A-4EA0-A5A0-492FA729F6ED}" type="pres">
       <dgm:prSet presAssocID="{B75F6A3A-9A51-4DF3-8A57-9AEB0739425C}" presName="composite" presStyleCnt="0"/>
@@ -2644,13 +2623,6 @@
         </dgm:presLayoutVars>
       </dgm:prSet>
       <dgm:spPr/>
-      <dgm:t>
-        <a:bodyPr/>
-        <a:lstStyle/>
-        <a:p>
-          <a:endParaRPr lang="ru-RU"/>
-        </a:p>
-      </dgm:t>
     </dgm:pt>
     <dgm:pt modelId="{61EB78D8-69FF-471D-8FEB-71388C442F55}" type="pres">
       <dgm:prSet presAssocID="{B75F6A3A-9A51-4DF3-8A57-9AEB0739425C}" presName="rect1" presStyleLbl="alignImgPlace1" presStyleIdx="0" presStyleCnt="1" custScaleX="596594" custScaleY="114980" custLinFactX="-64576" custLinFactNeighborX="-100000" custLinFactNeighborY="-13065"/>
@@ -2672,9 +2644,9 @@
     </dgm:pt>
   </dgm:ptLst>
   <dgm:cxnLst>
-    <dgm:cxn modelId="{017518C9-1619-4B19-AA03-86BA999BA287}" srcId="{EAB81984-5B84-4970-8447-2B456B8C58DF}" destId="{B75F6A3A-9A51-4DF3-8A57-9AEB0739425C}" srcOrd="0" destOrd="0" parTransId="{203596AF-4F49-40BA-B1E1-11BDD34B512E}" sibTransId="{A056157B-3867-49A4-9195-F3A4F3FBBA8E}"/>
     <dgm:cxn modelId="{1CEAA455-5BF4-4666-95B8-390900AB8124}" type="presOf" srcId="{EAB81984-5B84-4970-8447-2B456B8C58DF}" destId="{3A252E36-3D7E-49E5-B812-EE4CACF0D5CF}" srcOrd="0" destOrd="0" presId="urn:microsoft.com/office/officeart/2008/layout/PictureGrid"/>
     <dgm:cxn modelId="{147A14B3-96E8-4139-969B-9DB1BCB4D95E}" type="presOf" srcId="{B75F6A3A-9A51-4DF3-8A57-9AEB0739425C}" destId="{B29ABF60-EC0F-45AD-A90E-9C76D15C2F14}" srcOrd="0" destOrd="0" presId="urn:microsoft.com/office/officeart/2008/layout/PictureGrid"/>
+    <dgm:cxn modelId="{017518C9-1619-4B19-AA03-86BA999BA287}" srcId="{EAB81984-5B84-4970-8447-2B456B8C58DF}" destId="{B75F6A3A-9A51-4DF3-8A57-9AEB0739425C}" srcOrd="0" destOrd="0" parTransId="{203596AF-4F49-40BA-B1E1-11BDD34B512E}" sibTransId="{A056157B-3867-49A4-9195-F3A4F3FBBA8E}"/>
     <dgm:cxn modelId="{D3458AFA-605E-43EE-8C8A-0E0C1E3CD931}" type="presParOf" srcId="{3A252E36-3D7E-49E5-B812-EE4CACF0D5CF}" destId="{CF6D50B3-578A-4EA0-A5A0-492FA729F6ED}" srcOrd="0" destOrd="0" presId="urn:microsoft.com/office/officeart/2008/layout/PictureGrid"/>
     <dgm:cxn modelId="{9835F3F3-3E30-4AC4-AD89-BC095FA9A878}" type="presParOf" srcId="{CF6D50B3-578A-4EA0-A5A0-492FA729F6ED}" destId="{B29ABF60-EC0F-45AD-A90E-9C76D15C2F14}" srcOrd="0" destOrd="0" presId="urn:microsoft.com/office/officeart/2008/layout/PictureGrid"/>
     <dgm:cxn modelId="{70FA379F-7827-49B9-806E-1FD72CAE8F89}" type="presParOf" srcId="{CF6D50B3-578A-4EA0-A5A0-492FA729F6ED}" destId="{61EB78D8-69FF-471D-8FEB-71388C442F55}" srcOrd="1" destOrd="0" presId="urn:microsoft.com/office/officeart/2008/layout/PictureGrid"/>
@@ -2764,13 +2736,6 @@
         </dgm:presLayoutVars>
       </dgm:prSet>
       <dgm:spPr/>
-      <dgm:t>
-        <a:bodyPr/>
-        <a:lstStyle/>
-        <a:p>
-          <a:endParaRPr lang="ru-RU"/>
-        </a:p>
-      </dgm:t>
     </dgm:pt>
     <dgm:pt modelId="{65D73C51-61AB-436D-8191-975603FC9C68}" type="pres">
       <dgm:prSet presAssocID="{9C9C0585-42CE-4F34-A2BB-F1377DA03788}" presName="composite" presStyleCnt="0"/>
@@ -2783,13 +2748,6 @@
         </dgm:presLayoutVars>
       </dgm:prSet>
       <dgm:spPr/>
-      <dgm:t>
-        <a:bodyPr/>
-        <a:lstStyle/>
-        <a:p>
-          <a:endParaRPr lang="ru-RU"/>
-        </a:p>
-      </dgm:t>
     </dgm:pt>
     <dgm:pt modelId="{DFDA3CA3-5C68-4A2F-A4A8-285063A35D87}" type="pres">
       <dgm:prSet presAssocID="{9C9C0585-42CE-4F34-A2BB-F1377DA03788}" presName="rect1" presStyleLbl="alignImgPlace1" presStyleIdx="0" presStyleCnt="1" custScaleX="62421" custScaleY="62421" custLinFactNeighborX="1076" custLinFactNeighborY="-52209"/>
@@ -2814,8 +2772,8 @@
     </dgm:pt>
   </dgm:ptLst>
   <dgm:cxnLst>
+    <dgm:cxn modelId="{A9E27516-E8E4-42A7-A155-024D48E79559}" type="presOf" srcId="{8F66C165-B39F-46D3-B19F-623799541DD3}" destId="{B6F028CB-F170-4FEF-BC3A-25F0E90D434A}" srcOrd="0" destOrd="0" presId="urn:microsoft.com/office/officeart/2008/layout/PictureGrid"/>
     <dgm:cxn modelId="{A177C822-7566-4410-A889-706A6CE15148}" srcId="{8F66C165-B39F-46D3-B19F-623799541DD3}" destId="{9C9C0585-42CE-4F34-A2BB-F1377DA03788}" srcOrd="0" destOrd="0" parTransId="{4E5DCF2B-AAE7-41E2-837F-518128C03597}" sibTransId="{56F70C7F-1925-4DBA-9BD6-AF5E91799A59}"/>
-    <dgm:cxn modelId="{A9E27516-E8E4-42A7-A155-024D48E79559}" type="presOf" srcId="{8F66C165-B39F-46D3-B19F-623799541DD3}" destId="{B6F028CB-F170-4FEF-BC3A-25F0E90D434A}" srcOrd="0" destOrd="0" presId="urn:microsoft.com/office/officeart/2008/layout/PictureGrid"/>
     <dgm:cxn modelId="{ACD53F50-5BA1-48C9-B5DF-09BF6DA4DE65}" type="presOf" srcId="{9C9C0585-42CE-4F34-A2BB-F1377DA03788}" destId="{A30F2283-C0A4-4A69-BCBE-833D967155A2}" srcOrd="0" destOrd="0" presId="urn:microsoft.com/office/officeart/2008/layout/PictureGrid"/>
     <dgm:cxn modelId="{CC189C1C-06A1-4F03-B886-67BF46A53703}" type="presParOf" srcId="{B6F028CB-F170-4FEF-BC3A-25F0E90D434A}" destId="{65D73C51-61AB-436D-8191-975603FC9C68}" srcOrd="0" destOrd="0" presId="urn:microsoft.com/office/officeart/2008/layout/PictureGrid"/>
     <dgm:cxn modelId="{CD7DB92E-B84F-43A0-AC2D-FBBFB40722EE}" type="presParOf" srcId="{65D73C51-61AB-436D-8191-975603FC9C68}" destId="{A30F2283-C0A4-4A69-BCBE-833D967155A2}" srcOrd="0" destOrd="0" presId="urn:microsoft.com/office/officeart/2008/layout/PictureGrid"/>
@@ -2876,7 +2834,7 @@
         </a:bodyPr>
         <a:lstStyle/>
         <a:p>
-          <a:pPr lvl="0" algn="l" defTabSz="222250">
+          <a:pPr marL="0" lvl="0" indent="0" algn="l" defTabSz="222250">
             <a:lnSpc>
               <a:spcPct val="90000"/>
             </a:lnSpc>
@@ -2886,6 +2844,7 @@
             <a:spcAft>
               <a:spcPct val="35000"/>
             </a:spcAft>
+            <a:buNone/>
           </a:pPr>
           <a:r>
             <a:rPr lang="ru-RU" sz="500" kern="1200" dirty="0"/>
@@ -2999,7 +2958,7 @@
         </a:bodyPr>
         <a:lstStyle/>
         <a:p>
-          <a:pPr lvl="0" algn="l" defTabSz="222250">
+          <a:pPr marL="0" lvl="0" indent="0" algn="l" defTabSz="222250">
             <a:lnSpc>
               <a:spcPct val="90000"/>
             </a:lnSpc>
@@ -3009,6 +2968,7 @@
             <a:spcAft>
               <a:spcPct val="35000"/>
             </a:spcAft>
+            <a:buNone/>
           </a:pPr>
           <a:r>
             <a:rPr lang="ru-RU" sz="500" kern="1200" dirty="0"/>
@@ -3122,7 +3082,7 @@
         </a:bodyPr>
         <a:lstStyle/>
         <a:p>
-          <a:pPr lvl="0" algn="ctr" defTabSz="1778000">
+          <a:pPr marL="0" lvl="0" indent="0" algn="ctr" defTabSz="1778000">
             <a:lnSpc>
               <a:spcPct val="90000"/>
             </a:lnSpc>
@@ -3132,6 +3092,7 @@
             <a:spcAft>
               <a:spcPct val="35000"/>
             </a:spcAft>
+            <a:buNone/>
           </a:pPr>
           <a:r>
             <a:rPr lang="ru-RU" sz="4000" kern="1200" dirty="0">
@@ -7192,7 +7153,7 @@
           <a:p>
             <a:fld id="{16E5F246-0B7D-44DF-8C1B-EDFCA5DA626A}" type="datetimeFigureOut">
               <a:rPr lang="ru-RU" smtClean="0"/>
-              <a:t>17.10.2017</a:t>
+              <a:t>12.11.2017</a:t>
             </a:fld>
             <a:endParaRPr lang="ru-RU"/>
           </a:p>
@@ -13274,13 +13235,6 @@
   <p:clrMapOvr>
     <a:masterClrMapping/>
   </p:clrMapOvr>
-  <p:timing>
-    <p:tnLst>
-      <p:par>
-        <p:cTn id="1" dur="indefinite" restart="never" nodeType="tmRoot"/>
-      </p:par>
-    </p:tnLst>
-  </p:timing>
 </p:sld>
 </file>
 
@@ -13311,7 +13265,7 @@
             <p:ph sz="quarter" idx="13"/>
             <p:extLst>
               <p:ext uri="{D42A27DB-BD31-4B8C-83A1-F6EECF244321}">
-                <p14:modId xmlns:p14="http://schemas.microsoft.com/office/powerpoint/2010/main" val="133705641"/>
+                <p14:modId xmlns:p14="http://schemas.microsoft.com/office/powerpoint/2010/main" val="1996526984"/>
               </p:ext>
             </p:extLst>
           </p:nvPr>
@@ -13324,7 +13278,7 @@
           <a:graphicData uri="http://schemas.openxmlformats.org/presentationml/2006/ole">
             <mc:AlternateContent xmlns:mc="http://schemas.openxmlformats.org/markup-compatibility/2006">
               <mc:Choice xmlns:v="urn:schemas-microsoft-com:vml" Requires="v">
-                <p:oleObj spid="_x0000_s1094" name="VISIO" r:id="rId4" imgW="2544803" imgH="251238" progId="Visio.Drawing.5">
+                <p:oleObj spid="_x0000_s1095" name="VISIO" r:id="rId4" imgW="2544803" imgH="251238" progId="Visio.Drawing.5">
                   <p:embed/>
                 </p:oleObj>
               </mc:Choice>
@@ -13564,31 +13518,31 @@
           <a:p>
             <a:pPr eaLnBrk="1" hangingPunct="1"/>
             <a:r>
-              <a:rPr lang="ru-RU" altLang="ru-RU" dirty="0" smtClean="0">
+              <a:rPr lang="ru-RU" altLang="ru-RU" dirty="0">
                 <a:latin typeface="Arial" panose="020B0604020202020204" pitchFamily="34" charset="0"/>
               </a:rPr>
               <a:t>Игра состоит из 10 фреймов, в каждом фрейме у игрока есть две попытки, чтобы выбить 10 кеглей. Счет за фрейм – это количество сбитых кеглей плюс бонусы за </a:t>
             </a:r>
             <a:r>
-              <a:rPr lang="ru-RU" altLang="ru-RU" dirty="0" err="1" smtClean="0">
+              <a:rPr lang="ru-RU" altLang="ru-RU" dirty="0" err="1">
                 <a:latin typeface="Arial" panose="020B0604020202020204" pitchFamily="34" charset="0"/>
               </a:rPr>
               <a:t>страйки</a:t>
             </a:r>
             <a:r>
-              <a:rPr lang="ru-RU" altLang="ru-RU" dirty="0" smtClean="0">
+              <a:rPr lang="ru-RU" altLang="ru-RU" dirty="0">
                 <a:latin typeface="Arial" panose="020B0604020202020204" pitchFamily="34" charset="0"/>
               </a:rPr>
               <a:t> и </a:t>
             </a:r>
             <a:r>
-              <a:rPr lang="ru-RU" altLang="ru-RU" dirty="0" err="1" smtClean="0">
+              <a:rPr lang="ru-RU" altLang="ru-RU" dirty="0" err="1">
                 <a:latin typeface="Arial" panose="020B0604020202020204" pitchFamily="34" charset="0"/>
               </a:rPr>
               <a:t>спэры</a:t>
             </a:r>
             <a:r>
-              <a:rPr lang="ru-RU" altLang="ru-RU" dirty="0" smtClean="0">
+              <a:rPr lang="ru-RU" altLang="ru-RU" dirty="0">
                 <a:latin typeface="Arial" panose="020B0604020202020204" pitchFamily="34" charset="0"/>
               </a:rPr>
               <a:t>.</a:t>
@@ -13603,13 +13557,25 @@
           <a:p>
             <a:pPr eaLnBrk="1" hangingPunct="1"/>
             <a:r>
-              <a:rPr lang="ru-RU" altLang="ru-RU" dirty="0" err="1" smtClean="0">
+              <a:rPr lang="ru-RU" altLang="ru-RU" dirty="0" err="1">
                 <a:latin typeface="Arial" panose="020B0604020202020204" pitchFamily="34" charset="0"/>
               </a:rPr>
               <a:t>Спэр</a:t>
             </a:r>
             <a:r>
-              <a:rPr lang="ru-RU" altLang="ru-RU" dirty="0" smtClean="0">
+              <a:rPr lang="ru-RU" altLang="ru-RU" dirty="0">
+                <a:latin typeface="Arial" panose="020B0604020202020204" pitchFamily="34" charset="0"/>
+              </a:rPr>
+              <a:t> (</a:t>
+            </a:r>
+            <a:r>
+              <a:rPr lang="en-US" altLang="ru-RU" dirty="0">
+                <a:latin typeface="Arial" panose="020B0604020202020204" pitchFamily="34" charset="0"/>
+              </a:rPr>
+              <a:t>spare)</a:t>
+            </a:r>
+            <a:r>
+              <a:rPr lang="ru-RU" altLang="ru-RU" dirty="0">
                 <a:latin typeface="Arial" panose="020B0604020202020204" pitchFamily="34" charset="0"/>
               </a:rPr>
               <a:t> – это ситуация, когда игрок выбивает 10 кеглей двумя бросками. Бонус в этом фрейме равен количеству кеглей, сбитых следующим броском.</a:t>
@@ -13618,7 +13584,7 @@
           <a:p>
             <a:pPr eaLnBrk="1" hangingPunct="1"/>
             <a:r>
-              <a:rPr lang="ru-RU" altLang="ru-RU" i="1" dirty="0" smtClean="0">
+              <a:rPr lang="ru-RU" altLang="ru-RU" i="1" dirty="0">
                 <a:latin typeface="Arial" panose="020B0604020202020204" pitchFamily="34" charset="0"/>
               </a:rPr>
               <a:t>Счет за 3 фрейм равен 10 плюс бонус в 5.</a:t>
@@ -13633,22 +13599,34 @@
           <a:p>
             <a:pPr eaLnBrk="1" hangingPunct="1"/>
             <a:r>
-              <a:rPr lang="ru-RU" altLang="ru-RU" dirty="0" smtClean="0">
+              <a:rPr lang="ru-RU" altLang="ru-RU" dirty="0">
                 <a:latin typeface="Arial" panose="020B0604020202020204" pitchFamily="34" charset="0"/>
               </a:rPr>
-              <a:t>Стра</a:t>
-            </a:r>
-            <a:r>
-              <a:rPr lang="ru-RU" altLang="ru-RU" dirty="0" smtClean="0">
+              <a:t>Страйк</a:t>
+            </a:r>
+            <a:r>
+              <a:rPr lang="en-US" altLang="ru-RU">
                 <a:latin typeface="Arial" panose="020B0604020202020204" pitchFamily="34" charset="0"/>
               </a:rPr>
-              <a:t>йк – это ситуация, когда игрок выбивает 10 кеглей первым броском. Бонус в этом фрейме равен количеству кеглей, сбитых следующими двумя бросками.</a:t>
+              <a:t> (strike)</a:t>
+            </a:r>
+            <a:r>
+              <a:rPr lang="ru-RU" altLang="ru-RU">
+                <a:latin typeface="Arial" panose="020B0604020202020204" pitchFamily="34" charset="0"/>
+              </a:rPr>
+              <a:t> </a:t>
+            </a:r>
+            <a:r>
+              <a:rPr lang="ru-RU" altLang="ru-RU" dirty="0">
+                <a:latin typeface="Arial" panose="020B0604020202020204" pitchFamily="34" charset="0"/>
+              </a:rPr>
+              <a:t>– это ситуация, когда игрок выбивает 10 кеглей первым броском. Бонус в этом фрейме равен количеству кеглей, сбитых следующими двумя бросками.</a:t>
             </a:r>
           </a:p>
           <a:p>
             <a:pPr eaLnBrk="1" hangingPunct="1"/>
             <a:r>
-              <a:rPr lang="ru-RU" altLang="ru-RU" i="1" dirty="0" smtClean="0">
+              <a:rPr lang="ru-RU" altLang="ru-RU" i="1" dirty="0">
                 <a:latin typeface="Arial" panose="020B0604020202020204" pitchFamily="34" charset="0"/>
               </a:rPr>
               <a:t>Счет за 5 фрейм равен 10, плюс бонус в 0 + 1.</a:t>
@@ -13663,40 +13641,28 @@
           <a:p>
             <a:pPr eaLnBrk="1" hangingPunct="1"/>
             <a:r>
-              <a:rPr lang="ru-RU" altLang="ru-RU" dirty="0" smtClean="0">
+              <a:rPr lang="ru-RU" altLang="ru-RU" dirty="0">
                 <a:latin typeface="Arial" panose="020B0604020202020204" pitchFamily="34" charset="0"/>
               </a:rPr>
               <a:t>В десятом фрейме игрок, выбивающий </a:t>
             </a:r>
             <a:r>
-              <a:rPr lang="ru-RU" altLang="ru-RU" dirty="0" err="1" smtClean="0">
+              <a:rPr lang="ru-RU" altLang="ru-RU" dirty="0" err="1">
                 <a:latin typeface="Arial" panose="020B0604020202020204" pitchFamily="34" charset="0"/>
               </a:rPr>
               <a:t>спэр</a:t>
             </a:r>
             <a:r>
-              <a:rPr lang="ru-RU" altLang="ru-RU" dirty="0" smtClean="0">
+              <a:rPr lang="ru-RU" altLang="ru-RU" dirty="0">
                 <a:latin typeface="Arial" panose="020B0604020202020204" pitchFamily="34" charset="0"/>
               </a:rPr>
-              <a:t> или </a:t>
-            </a:r>
-            <a:r>
-              <a:rPr lang="ru-RU" altLang="ru-RU" dirty="0" err="1" smtClean="0">
-                <a:latin typeface="Arial" panose="020B0604020202020204" pitchFamily="34" charset="0"/>
-              </a:rPr>
-              <a:t>страйк</a:t>
-            </a:r>
-            <a:r>
-              <a:rPr lang="ru-RU" altLang="ru-RU" dirty="0" smtClean="0">
-                <a:latin typeface="Arial" panose="020B0604020202020204" pitchFamily="34" charset="0"/>
-              </a:rPr>
-              <a:t>, получает дополнительный бросок, чтобы закончить фрейм. Максимальное число бросков в десятом фрейме – 3. Бонусные очки в этом фрейме не начисляются.</a:t>
+              <a:t> или страйк, получает дополнительный бросок, чтобы закончить фрейм. Максимальное число бросков в десятом фрейме – 3. Бонусные очки в этом фрейме не начисляются.</a:t>
             </a:r>
           </a:p>
           <a:p>
             <a:pPr eaLnBrk="1" hangingPunct="1"/>
             <a:r>
-              <a:rPr lang="ru-RU" altLang="ru-RU" i="1" dirty="0" smtClean="0">
+              <a:rPr lang="ru-RU" altLang="ru-RU" i="1" dirty="0">
                 <a:latin typeface="Arial" panose="020B0604020202020204" pitchFamily="34" charset="0"/>
               </a:rPr>
               <a:t>В 9 фрейме счет за фрейм равен 10 + 2 + 8. За 10 фрейм счет равен 2 + 8 + 6.</a:t>
@@ -13714,13 +13680,6 @@
   <p:clrMapOvr>
     <a:masterClrMapping/>
   </p:clrMapOvr>
-  <p:timing>
-    <p:tnLst>
-      <p:par>
-        <p:cTn id="1" dur="indefinite" restart="never" nodeType="tmRoot"/>
-      </p:par>
-    </p:tnLst>
-  </p:timing>
 </p:sld>
 </file>
 
@@ -13873,13 +13832,6 @@
   <p:clrMapOvr>
     <a:masterClrMapping/>
   </p:clrMapOvr>
-  <p:timing>
-    <p:tnLst>
-      <p:par>
-        <p:cTn id="1" dur="indefinite" restart="never" nodeType="tmRoot"/>
-      </p:par>
-    </p:tnLst>
-  </p:timing>
 </p:sld>
 </file>
 
@@ -13995,21 +13947,6 @@
   <p:clrMapOvr>
     <a:masterClrMapping/>
   </p:clrMapOvr>
-  <mc:AlternateContent xmlns:mc="http://schemas.openxmlformats.org/markup-compatibility/2006">
-    <mc:Choice xmlns:p14="http://schemas.microsoft.com/office/powerpoint/2010/main" Requires="p14">
-      <p:transition spd="slow" p14:dur="2000"/>
-    </mc:Choice>
-    <mc:Fallback>
-      <p:transition spd="slow"/>
-    </mc:Fallback>
-  </mc:AlternateContent>
-  <p:timing>
-    <p:tnLst>
-      <p:par>
-        <p:cTn id="1" dur="indefinite" restart="never" nodeType="tmRoot"/>
-      </p:par>
-    </p:tnLst>
-  </p:timing>
 </p:sld>
 </file>
 
@@ -14104,14 +14041,6 @@
   <p:clrMapOvr>
     <a:masterClrMapping/>
   </p:clrMapOvr>
-  <mc:AlternateContent xmlns:mc="http://schemas.openxmlformats.org/markup-compatibility/2006">
-    <mc:Choice xmlns:p14="http://schemas.microsoft.com/office/powerpoint/2010/main" Requires="p14">
-      <p:transition spd="slow" p14:dur="2000"/>
-    </mc:Choice>
-    <mc:Fallback>
-      <p:transition spd="slow"/>
-    </mc:Fallback>
-  </mc:AlternateContent>
 </p:sld>
 </file>
 
@@ -14745,10 +14674,6 @@
             <a:r>
               <a:rPr lang="ru-RU" sz="2100" dirty="0"/>
               <a:t>Добавьте простейший код, проходящий тест.</a:t>
-            </a:r>
-            <a:r>
-              <a:rPr lang="en-US" sz="2100" dirty="0"/>
-              <a:t/>
             </a:r>
             <a:br>
               <a:rPr lang="en-US" sz="2100" dirty="0"/>
@@ -15603,10 +15528,6 @@
                 </a:solidFill>
               </a:rPr>
               <a:t>demo</a:t>
-            </a:r>
-            <a:r>
-              <a:rPr lang="en-US" dirty="0"/>
-              <a:t/>
             </a:r>
             <a:br>
               <a:rPr lang="en-US" dirty="0"/>

</xml_diff>